<commit_message>
Changed resolve to resolveConundrum
</commit_message>
<xml_diff>
--- a/docs/raw/raw.pptx
+++ b/docs/raw/raw.pptx
@@ -5,13 +5,14 @@
     <p:sldMasterId id="2147483648" r:id="rId1"/>
   </p:sldMasterIdLst>
   <p:notesMasterIdLst>
-    <p:notesMasterId r:id="rId4"/>
+    <p:notesMasterId r:id="rId5"/>
   </p:notesMasterIdLst>
   <p:handoutMasterIdLst>
-    <p:handoutMasterId r:id="rId5"/>
+    <p:handoutMasterId r:id="rId6"/>
   </p:handoutMasterIdLst>
   <p:sldIdLst>
     <p:sldId id="256" r:id="rId3"/>
+    <p:sldId id="257" r:id="rId4"/>
   </p:sldIdLst>
   <p:sldSz cx="12192000" cy="6858000"/>
   <p:notesSz cx="7103745" cy="10234295"/>
@@ -3572,7 +3573,7 @@
           <a:bodyPr rtlCol="0" anchor="ctr"/>
           <a:p>
             <a:pPr algn="ctr"/>
-            <a:endParaRPr lang="" altLang="en-US"/>
+            <a:endParaRPr lang="en-US" altLang="en-US"/>
           </a:p>
         </p:txBody>
       </p:sp>
@@ -3620,10 +3621,10 @@
           <a:p>
             <a:pPr algn="ctr"/>
             <a:r>
-              <a:rPr lang="" altLang="en-US"/>
+              <a:rPr lang="en-US" altLang="en-US"/>
               <a:t>ViewModel</a:t>
             </a:r>
-            <a:endParaRPr lang="" altLang="en-US"/>
+            <a:endParaRPr lang="en-US" altLang="en-US"/>
           </a:p>
         </p:txBody>
       </p:sp>
@@ -3671,10 +3672,10 @@
           <a:p>
             <a:pPr algn="ctr"/>
             <a:r>
-              <a:rPr lang="" altLang="en-US"/>
+              <a:rPr lang="en-US" altLang="en-US"/>
               <a:t>Intent A</a:t>
             </a:r>
-            <a:endParaRPr lang="" altLang="en-US"/>
+            <a:endParaRPr lang="en-US" altLang="en-US"/>
           </a:p>
         </p:txBody>
       </p:sp>
@@ -3723,13 +3724,9 @@
             <a:pPr algn="ctr"/>
             <a:r>
               <a:rPr lang="en-US" altLang="en-US"/>
-              <a:t>Intent </a:t>
-            </a:r>
-            <a:r>
-              <a:rPr lang="" altLang="en-US"/>
-              <a:t>B</a:t>
-            </a:r>
-            <a:endParaRPr lang="" altLang="en-US"/>
+              <a:t>Intent B</a:t>
+            </a:r>
+            <a:endParaRPr lang="en-US" altLang="en-US"/>
           </a:p>
         </p:txBody>
       </p:sp>
@@ -3778,13 +3775,9 @@
             <a:pPr algn="ctr"/>
             <a:r>
               <a:rPr lang="en-US" altLang="en-US"/>
-              <a:t>Intent </a:t>
-            </a:r>
-            <a:r>
-              <a:rPr lang="" altLang="en-US"/>
-              <a:t>C</a:t>
-            </a:r>
-            <a:endParaRPr lang="" altLang="en-US"/>
+              <a:t>Intent C</a:t>
+            </a:r>
+            <a:endParaRPr lang="en-US" altLang="en-US"/>
           </a:p>
         </p:txBody>
       </p:sp>
@@ -3931,10 +3924,10 @@
           <a:p>
             <a:pPr algn="ctr"/>
             <a:r>
-              <a:rPr lang="" altLang="en-US"/>
+              <a:rPr lang="en-US" altLang="en-US"/>
               <a:t>State 1</a:t>
             </a:r>
-            <a:endParaRPr lang="" altLang="en-US"/>
+            <a:endParaRPr lang="en-US" altLang="en-US"/>
           </a:p>
         </p:txBody>
       </p:sp>
@@ -3975,13 +3968,9 @@
             <a:pPr algn="ctr"/>
             <a:r>
               <a:rPr lang="en-US" altLang="en-US"/>
-              <a:t>State </a:t>
-            </a:r>
-            <a:r>
-              <a:rPr lang="" altLang="en-US"/>
-              <a:t>2</a:t>
-            </a:r>
-            <a:endParaRPr lang="" altLang="en-US"/>
+              <a:t>State 2</a:t>
+            </a:r>
+            <a:endParaRPr lang="en-US" altLang="en-US"/>
           </a:p>
         </p:txBody>
       </p:sp>
@@ -4022,13 +4011,9 @@
             <a:pPr algn="ctr"/>
             <a:r>
               <a:rPr lang="en-US" altLang="en-US"/>
-              <a:t>State </a:t>
-            </a:r>
-            <a:r>
-              <a:rPr lang="" altLang="en-US"/>
-              <a:t>3</a:t>
-            </a:r>
-            <a:endParaRPr lang="" altLang="en-US"/>
+              <a:t>State 3</a:t>
+            </a:r>
+            <a:endParaRPr lang="en-US" altLang="en-US"/>
           </a:p>
         </p:txBody>
       </p:sp>
@@ -4069,13 +4054,9 @@
             <a:pPr algn="ctr"/>
             <a:r>
               <a:rPr lang="en-US" altLang="en-US"/>
-              <a:t>State </a:t>
-            </a:r>
-            <a:r>
-              <a:rPr lang="" altLang="en-US"/>
-              <a:t>4</a:t>
-            </a:r>
-            <a:endParaRPr lang="" altLang="en-US"/>
+              <a:t>State 4</a:t>
+            </a:r>
+            <a:endParaRPr lang="en-US" altLang="en-US"/>
           </a:p>
         </p:txBody>
       </p:sp>
@@ -4138,13 +4119,359 @@
           <a:p>
             <a:pPr algn="ctr"/>
             <a:r>
+              <a:rPr lang="en-US" altLang="en-US"/>
+              <a:t>UI Scope</a:t>
+            </a:r>
+            <a:endParaRPr lang="en-US" altLang="en-US"/>
+          </a:p>
+        </p:txBody>
+      </p:sp>
+    </p:spTree>
+  </p:cSld>
+  <p:clrMapOvr>
+    <a:masterClrMapping/>
+  </p:clrMapOvr>
+</p:sld>
+</file>
+
+<file path=ppt/slides/slide2.xml><?xml version="1.0" encoding="utf-8"?>
+<p:sld xmlns:a="http://schemas.openxmlformats.org/drawingml/2006/main" xmlns:r="http://schemas.openxmlformats.org/officeDocument/2006/relationships" xmlns:p="http://schemas.openxmlformats.org/presentationml/2006/main">
+  <p:cSld>
+    <p:spTree>
+      <p:nvGrpSpPr>
+        <p:cNvPr id="1" name=""/>
+        <p:cNvGrpSpPr/>
+        <p:nvPr/>
+      </p:nvGrpSpPr>
+      <p:grpSpPr/>
+      <p:sp>
+        <p:nvSpPr>
+          <p:cNvPr id="4" name="Rounded Rectangle 3"/>
+          <p:cNvSpPr/>
+          <p:nvPr/>
+        </p:nvSpPr>
+        <p:spPr>
+          <a:xfrm>
+            <a:off x="2565400" y="4029075"/>
+            <a:ext cx="2729230" cy="1127760"/>
+          </a:xfrm>
+          <a:prstGeom prst="roundRect">
+            <a:avLst/>
+          </a:prstGeom>
+        </p:spPr>
+        <p:style>
+          <a:lnRef idx="2">
+            <a:schemeClr val="accent1">
+              <a:shade val="50000"/>
+            </a:schemeClr>
+          </a:lnRef>
+          <a:fillRef idx="1">
+            <a:schemeClr val="accent1"/>
+          </a:fillRef>
+          <a:effectRef idx="0">
+            <a:schemeClr val="accent1"/>
+          </a:effectRef>
+          <a:fontRef idx="minor">
+            <a:schemeClr val="lt1"/>
+          </a:fontRef>
+        </p:style>
+        <p:txBody>
+          <a:bodyPr rtlCol="0" anchor="ctr"/>
+          <a:p>
+            <a:pPr algn="ctr"/>
+            <a:r>
               <a:rPr lang="" altLang="en-US"/>
-              <a:t>UI Scope</a:t>
+              <a:t>PiMonitor API</a:t>
             </a:r>
             <a:endParaRPr lang="" altLang="en-US"/>
           </a:p>
         </p:txBody>
       </p:sp>
+      <p:sp>
+        <p:nvSpPr>
+          <p:cNvPr id="5" name="Rounded Rectangle 4"/>
+          <p:cNvSpPr/>
+          <p:nvPr/>
+        </p:nvSpPr>
+        <p:spPr>
+          <a:xfrm>
+            <a:off x="7252335" y="4029075"/>
+            <a:ext cx="2729230" cy="1127760"/>
+          </a:xfrm>
+          <a:prstGeom prst="roundRect">
+            <a:avLst/>
+          </a:prstGeom>
+        </p:spPr>
+        <p:style>
+          <a:lnRef idx="2">
+            <a:schemeClr val="accent1">
+              <a:shade val="50000"/>
+            </a:schemeClr>
+          </a:lnRef>
+          <a:fillRef idx="1">
+            <a:schemeClr val="accent1"/>
+          </a:fillRef>
+          <a:effectRef idx="0">
+            <a:schemeClr val="accent1"/>
+          </a:effectRef>
+          <a:fontRef idx="minor">
+            <a:schemeClr val="lt1"/>
+          </a:fontRef>
+        </p:style>
+        <p:txBody>
+          <a:bodyPr rtlCol="0" anchor="ctr"/>
+          <a:p>
+            <a:pPr algn="ctr"/>
+            <a:r>
+              <a:rPr lang="en-US" altLang="en-US"/>
+              <a:t>PiMonitor </a:t>
+            </a:r>
+            <a:r>
+              <a:rPr lang="" altLang="en-US"/>
+              <a:t>SDK</a:t>
+            </a:r>
+            <a:endParaRPr lang="" altLang="en-US"/>
+          </a:p>
+        </p:txBody>
+      </p:sp>
+      <p:sp>
+        <p:nvSpPr>
+          <p:cNvPr id="6" name="Rounded Rectangle 5"/>
+          <p:cNvSpPr/>
+          <p:nvPr/>
+        </p:nvSpPr>
+        <p:spPr>
+          <a:xfrm>
+            <a:off x="2549525" y="1459865"/>
+            <a:ext cx="2729230" cy="1127760"/>
+          </a:xfrm>
+          <a:prstGeom prst="roundRect">
+            <a:avLst/>
+          </a:prstGeom>
+        </p:spPr>
+        <p:style>
+          <a:lnRef idx="2">
+            <a:schemeClr val="accent1">
+              <a:shade val="50000"/>
+            </a:schemeClr>
+          </a:lnRef>
+          <a:fillRef idx="1">
+            <a:schemeClr val="accent1"/>
+          </a:fillRef>
+          <a:effectRef idx="0">
+            <a:schemeClr val="accent1"/>
+          </a:effectRef>
+          <a:fontRef idx="minor">
+            <a:schemeClr val="lt1"/>
+          </a:fontRef>
+        </p:style>
+        <p:txBody>
+          <a:bodyPr rtlCol="0" anchor="ctr"/>
+          <a:p>
+            <a:pPr algn="ctr"/>
+            <a:r>
+              <a:rPr lang="" altLang="en-US"/>
+              <a:t>Bitframe</a:t>
+            </a:r>
+            <a:r>
+              <a:rPr lang="en-US" altLang="en-US"/>
+              <a:t> API</a:t>
+            </a:r>
+            <a:endParaRPr lang="en-US" altLang="en-US"/>
+          </a:p>
+        </p:txBody>
+      </p:sp>
+      <p:sp>
+        <p:nvSpPr>
+          <p:cNvPr id="7" name="Rounded Rectangle 6"/>
+          <p:cNvSpPr/>
+          <p:nvPr/>
+        </p:nvSpPr>
+        <p:spPr>
+          <a:xfrm>
+            <a:off x="7236460" y="1459865"/>
+            <a:ext cx="2729230" cy="1127760"/>
+          </a:xfrm>
+          <a:prstGeom prst="roundRect">
+            <a:avLst/>
+          </a:prstGeom>
+        </p:spPr>
+        <p:style>
+          <a:lnRef idx="2">
+            <a:schemeClr val="accent1">
+              <a:shade val="50000"/>
+            </a:schemeClr>
+          </a:lnRef>
+          <a:fillRef idx="1">
+            <a:schemeClr val="accent1"/>
+          </a:fillRef>
+          <a:effectRef idx="0">
+            <a:schemeClr val="accent1"/>
+          </a:effectRef>
+          <a:fontRef idx="minor">
+            <a:schemeClr val="lt1"/>
+          </a:fontRef>
+        </p:style>
+        <p:txBody>
+          <a:bodyPr rtlCol="0" anchor="ctr"/>
+          <a:p>
+            <a:pPr algn="ctr"/>
+            <a:r>
+              <a:rPr lang="" altLang="en-US"/>
+              <a:t>Bitframe</a:t>
+            </a:r>
+            <a:r>
+              <a:rPr lang="en-US" altLang="en-US"/>
+              <a:t> SDK</a:t>
+            </a:r>
+            <a:endParaRPr lang="en-US" altLang="en-US"/>
+          </a:p>
+        </p:txBody>
+      </p:sp>
+      <p:cxnSp>
+        <p:nvCxnSpPr>
+          <p:cNvPr id="8" name="Straight Arrow Connector 7"/>
+          <p:cNvCxnSpPr>
+            <a:stCxn id="5" idx="1"/>
+            <a:endCxn id="4" idx="3"/>
+          </p:cNvCxnSpPr>
+          <p:nvPr/>
+        </p:nvCxnSpPr>
+        <p:spPr>
+          <a:xfrm flipH="true">
+            <a:off x="5294630" y="4592955"/>
+            <a:ext cx="1957705" cy="0"/>
+          </a:xfrm>
+          <a:prstGeom prst="straightConnector1">
+            <a:avLst/>
+          </a:prstGeom>
+          <a:ln>
+            <a:tailEnd type="arrow"/>
+          </a:ln>
+        </p:spPr>
+        <p:style>
+          <a:lnRef idx="1">
+            <a:schemeClr val="accent1"/>
+          </a:lnRef>
+          <a:fillRef idx="0">
+            <a:schemeClr val="accent1"/>
+          </a:fillRef>
+          <a:effectRef idx="0">
+            <a:schemeClr val="accent1"/>
+          </a:effectRef>
+          <a:fontRef idx="minor">
+            <a:schemeClr val="tx1"/>
+          </a:fontRef>
+        </p:style>
+      </p:cxnSp>
+      <p:cxnSp>
+        <p:nvCxnSpPr>
+          <p:cNvPr id="9" name="Straight Arrow Connector 8"/>
+          <p:cNvCxnSpPr>
+            <a:stCxn id="7" idx="1"/>
+            <a:endCxn id="6" idx="3"/>
+          </p:cNvCxnSpPr>
+          <p:nvPr/>
+        </p:nvCxnSpPr>
+        <p:spPr>
+          <a:xfrm flipH="true">
+            <a:off x="5278755" y="2023745"/>
+            <a:ext cx="1957705" cy="0"/>
+          </a:xfrm>
+          <a:prstGeom prst="straightConnector1">
+            <a:avLst/>
+          </a:prstGeom>
+          <a:ln>
+            <a:tailEnd type="arrow"/>
+          </a:ln>
+        </p:spPr>
+        <p:style>
+          <a:lnRef idx="1">
+            <a:schemeClr val="accent1"/>
+          </a:lnRef>
+          <a:fillRef idx="0">
+            <a:schemeClr val="accent1"/>
+          </a:fillRef>
+          <a:effectRef idx="0">
+            <a:schemeClr val="accent1"/>
+          </a:effectRef>
+          <a:fontRef idx="minor">
+            <a:schemeClr val="tx1"/>
+          </a:fontRef>
+        </p:style>
+      </p:cxnSp>
+      <p:cxnSp>
+        <p:nvCxnSpPr>
+          <p:cNvPr id="12" name="Straight Arrow Connector 11"/>
+          <p:cNvCxnSpPr>
+            <a:stCxn id="5" idx="0"/>
+            <a:endCxn id="7" idx="2"/>
+          </p:cNvCxnSpPr>
+          <p:nvPr/>
+        </p:nvCxnSpPr>
+        <p:spPr>
+          <a:xfrm flipH="true" flipV="true">
+            <a:off x="8601075" y="2587625"/>
+            <a:ext cx="15875" cy="1441450"/>
+          </a:xfrm>
+          <a:prstGeom prst="straightConnector1">
+            <a:avLst/>
+          </a:prstGeom>
+          <a:ln>
+            <a:tailEnd type="arrow"/>
+          </a:ln>
+        </p:spPr>
+        <p:style>
+          <a:lnRef idx="1">
+            <a:schemeClr val="accent1"/>
+          </a:lnRef>
+          <a:fillRef idx="0">
+            <a:schemeClr val="accent1"/>
+          </a:fillRef>
+          <a:effectRef idx="0">
+            <a:schemeClr val="accent1"/>
+          </a:effectRef>
+          <a:fontRef idx="minor">
+            <a:schemeClr val="tx1"/>
+          </a:fontRef>
+        </p:style>
+      </p:cxnSp>
+      <p:cxnSp>
+        <p:nvCxnSpPr>
+          <p:cNvPr id="17" name="Straight Arrow Connector 16"/>
+          <p:cNvCxnSpPr>
+            <a:stCxn id="4" idx="0"/>
+            <a:endCxn id="6" idx="2"/>
+          </p:cNvCxnSpPr>
+          <p:nvPr/>
+        </p:nvCxnSpPr>
+        <p:spPr>
+          <a:xfrm flipH="true" flipV="true">
+            <a:off x="3914140" y="2587625"/>
+            <a:ext cx="15875" cy="1441450"/>
+          </a:xfrm>
+          <a:prstGeom prst="straightConnector1">
+            <a:avLst/>
+          </a:prstGeom>
+          <a:ln>
+            <a:tailEnd type="arrow"/>
+          </a:ln>
+        </p:spPr>
+        <p:style>
+          <a:lnRef idx="1">
+            <a:schemeClr val="accent1"/>
+          </a:lnRef>
+          <a:fillRef idx="0">
+            <a:schemeClr val="accent1"/>
+          </a:fillRef>
+          <a:effectRef idx="0">
+            <a:schemeClr val="accent1"/>
+          </a:effectRef>
+          <a:fontRef idx="minor">
+            <a:schemeClr val="tx1"/>
+          </a:fontRef>
+        </p:style>
+      </p:cxnSp>
     </p:spTree>
   </p:cSld>
   <p:clrMapOvr>

</xml_diff>